<commit_message>
Se agrega informacion de backend
</commit_message>
<xml_diff>
--- a/Frontend.pptx
+++ b/Frontend.pptx
@@ -12,6 +12,16 @@
     <p:sldId id="260" r:id="rId6"/>
     <p:sldId id="261" r:id="rId7"/>
     <p:sldId id="262" r:id="rId8"/>
+    <p:sldId id="263" r:id="rId9"/>
+    <p:sldId id="264" r:id="rId10"/>
+    <p:sldId id="265" r:id="rId11"/>
+    <p:sldId id="266" r:id="rId12"/>
+    <p:sldId id="268" r:id="rId13"/>
+    <p:sldId id="267" r:id="rId14"/>
+    <p:sldId id="269" r:id="rId15"/>
+    <p:sldId id="271" r:id="rId16"/>
+    <p:sldId id="272" r:id="rId17"/>
+    <p:sldId id="270" r:id="rId18"/>
   </p:sldIdLst>
   <p:sldSz cx="12192000" cy="6858000"/>
   <p:notesSz cx="6858000" cy="9144000"/>
@@ -302,7 +312,7 @@
             <a:fld id="{B61BEF0D-F0BB-DE4B-95CE-6DB70DBA9567}" type="datetimeFigureOut">
               <a:rPr lang="en-US" dirty="0"/>
               <a:pPr/>
-              <a:t>8/17/2017</a:t>
+              <a:t>8/18/2017</a:t>
             </a:fld>
             <a:endParaRPr lang="en-US" dirty="0"/>
           </a:p>
@@ -637,7 +647,7 @@
             <a:fld id="{B61BEF0D-F0BB-DE4B-95CE-6DB70DBA9567}" type="datetimeFigureOut">
               <a:rPr lang="en-US" dirty="0"/>
               <a:pPr/>
-              <a:t>8/17/2017</a:t>
+              <a:t>8/18/2017</a:t>
             </a:fld>
             <a:endParaRPr lang="en-US" dirty="0"/>
           </a:p>
@@ -1035,7 +1045,7 @@
             <a:fld id="{B61BEF0D-F0BB-DE4B-95CE-6DB70DBA9567}" type="datetimeFigureOut">
               <a:rPr lang="en-US" dirty="0"/>
               <a:pPr/>
-              <a:t>8/17/2017</a:t>
+              <a:t>8/18/2017</a:t>
             </a:fld>
             <a:endParaRPr lang="en-US" dirty="0"/>
           </a:p>
@@ -1368,7 +1378,7 @@
             <a:fld id="{B61BEF0D-F0BB-DE4B-95CE-6DB70DBA9567}" type="datetimeFigureOut">
               <a:rPr lang="en-US" dirty="0"/>
               <a:pPr/>
-              <a:t>8/17/2017</a:t>
+              <a:t>8/18/2017</a:t>
             </a:fld>
             <a:endParaRPr lang="en-US" dirty="0"/>
           </a:p>
@@ -1685,7 +1695,7 @@
             <a:fld id="{B61BEF0D-F0BB-DE4B-95CE-6DB70DBA9567}" type="datetimeFigureOut">
               <a:rPr lang="en-US" dirty="0"/>
               <a:pPr/>
-              <a:t>8/17/2017</a:t>
+              <a:t>8/18/2017</a:t>
             </a:fld>
             <a:endParaRPr lang="en-US" dirty="0"/>
           </a:p>
@@ -2078,7 +2088,7 @@
             <a:fld id="{B61BEF0D-F0BB-DE4B-95CE-6DB70DBA9567}" type="datetimeFigureOut">
               <a:rPr lang="en-US" dirty="0"/>
               <a:pPr/>
-              <a:t>8/17/2017</a:t>
+              <a:t>8/18/2017</a:t>
             </a:fld>
             <a:endParaRPr lang="en-US" dirty="0"/>
           </a:p>
@@ -2332,7 +2342,7 @@
             <a:fld id="{B61BEF0D-F0BB-DE4B-95CE-6DB70DBA9567}" type="datetimeFigureOut">
               <a:rPr lang="en-US" dirty="0"/>
               <a:pPr/>
-              <a:t>8/17/2017</a:t>
+              <a:t>8/18/2017</a:t>
             </a:fld>
             <a:endParaRPr lang="en-US" dirty="0"/>
           </a:p>
@@ -2591,7 +2601,7 @@
             <a:fld id="{B61BEF0D-F0BB-DE4B-95CE-6DB70DBA9567}" type="datetimeFigureOut">
               <a:rPr lang="en-US" dirty="0"/>
               <a:pPr/>
-              <a:t>8/17/2017</a:t>
+              <a:t>8/18/2017</a:t>
             </a:fld>
             <a:endParaRPr lang="en-US" dirty="0"/>
           </a:p>
@@ -2850,7 +2860,7 @@
             <a:fld id="{B61BEF0D-F0BB-DE4B-95CE-6DB70DBA9567}" type="datetimeFigureOut">
               <a:rPr lang="en-US" dirty="0"/>
               <a:pPr/>
-              <a:t>8/17/2017</a:t>
+              <a:t>8/18/2017</a:t>
             </a:fld>
             <a:endParaRPr lang="en-US" dirty="0"/>
           </a:p>
@@ -3176,7 +3186,7 @@
             <a:fld id="{B61BEF0D-F0BB-DE4B-95CE-6DB70DBA9567}" type="datetimeFigureOut">
               <a:rPr lang="en-US" dirty="0"/>
               <a:pPr/>
-              <a:t>8/17/2017</a:t>
+              <a:t>8/18/2017</a:t>
             </a:fld>
             <a:endParaRPr lang="en-US" dirty="0"/>
           </a:p>
@@ -3496,7 +3506,7 @@
             <a:fld id="{B61BEF0D-F0BB-DE4B-95CE-6DB70DBA9567}" type="datetimeFigureOut">
               <a:rPr lang="en-US" dirty="0"/>
               <a:pPr/>
-              <a:t>8/17/2017</a:t>
+              <a:t>8/18/2017</a:t>
             </a:fld>
             <a:endParaRPr lang="en-US" dirty="0"/>
           </a:p>
@@ -3950,7 +3960,7 @@
             <a:fld id="{B61BEF0D-F0BB-DE4B-95CE-6DB70DBA9567}" type="datetimeFigureOut">
               <a:rPr lang="en-US" dirty="0"/>
               <a:pPr/>
-              <a:t>8/17/2017</a:t>
+              <a:t>8/18/2017</a:t>
             </a:fld>
             <a:endParaRPr lang="en-US" dirty="0"/>
           </a:p>
@@ -4152,7 +4162,7 @@
             <a:fld id="{B61BEF0D-F0BB-DE4B-95CE-6DB70DBA9567}" type="datetimeFigureOut">
               <a:rPr lang="en-US" dirty="0"/>
               <a:pPr/>
-              <a:t>8/17/2017</a:t>
+              <a:t>8/18/2017</a:t>
             </a:fld>
             <a:endParaRPr lang="en-US" dirty="0"/>
           </a:p>
@@ -4326,7 +4336,7 @@
             <a:fld id="{B61BEF0D-F0BB-DE4B-95CE-6DB70DBA9567}" type="datetimeFigureOut">
               <a:rPr lang="en-US" dirty="0"/>
               <a:pPr/>
-              <a:t>8/17/2017</a:t>
+              <a:t>8/18/2017</a:t>
             </a:fld>
             <a:endParaRPr lang="en-US" dirty="0"/>
           </a:p>
@@ -4656,7 +4666,7 @@
             <a:fld id="{B61BEF0D-F0BB-DE4B-95CE-6DB70DBA9567}" type="datetimeFigureOut">
               <a:rPr lang="en-US" dirty="0"/>
               <a:pPr/>
-              <a:t>8/17/2017</a:t>
+              <a:t>8/18/2017</a:t>
             </a:fld>
             <a:endParaRPr lang="en-US" dirty="0"/>
           </a:p>
@@ -4998,7 +5008,7 @@
             <a:fld id="{B61BEF0D-F0BB-DE4B-95CE-6DB70DBA9567}" type="datetimeFigureOut">
               <a:rPr lang="en-US" dirty="0"/>
               <a:pPr/>
-              <a:t>8/17/2017</a:t>
+              <a:t>8/18/2017</a:t>
             </a:fld>
             <a:endParaRPr lang="en-US" dirty="0"/>
           </a:p>
@@ -7112,7 +7122,7 @@
             <a:fld id="{B61BEF0D-F0BB-DE4B-95CE-6DB70DBA9567}" type="datetimeFigureOut">
               <a:rPr lang="en-US" dirty="0"/>
               <a:pPr/>
-              <a:t>8/17/2017</a:t>
+              <a:t>8/18/2017</a:t>
             </a:fld>
             <a:endParaRPr lang="en-US" dirty="0"/>
           </a:p>
@@ -7695,9 +7705,787 @@
     </p:spTree>
     <p:extLst>
       <p:ext uri="{BB962C8B-B14F-4D97-AF65-F5344CB8AC3E}">
-        <p14:creationId xmlns:p14="http://schemas.microsoft.com/office/powerpoint/2010/main" val="2933505555"/>
+        <p14:creationId xmlns:p14="http://schemas.microsoft.com/office/powerpoint/2010/main" xmlns="" val="2933505555"/>
       </p:ext>
     </p:extLst>
+  </p:cSld>
+  <p:clrMapOvr>
+    <a:masterClrMapping/>
+  </p:clrMapOvr>
+</p:sld>
+</file>
+
+<file path=ppt/slides/slide10.xml><?xml version="1.0" encoding="utf-8"?>
+<p:sld xmlns:a="http://schemas.openxmlformats.org/drawingml/2006/main" xmlns:r="http://schemas.openxmlformats.org/officeDocument/2006/relationships" xmlns:p="http://schemas.openxmlformats.org/presentationml/2006/main">
+  <p:cSld>
+    <p:spTree>
+      <p:nvGrpSpPr>
+        <p:cNvPr id="1" name=""/>
+        <p:cNvGrpSpPr/>
+        <p:nvPr/>
+      </p:nvGrpSpPr>
+      <p:grpSpPr>
+        <a:xfrm>
+          <a:off x="0" y="0"/>
+          <a:ext cx="0" cy="0"/>
+          <a:chOff x="0" y="0"/>
+          <a:chExt cx="0" cy="0"/>
+        </a:xfrm>
+      </p:grpSpPr>
+      <p:sp>
+        <p:nvSpPr>
+          <p:cNvPr id="2" name="1 Título"/>
+          <p:cNvSpPr>
+            <a:spLocks noGrp="1"/>
+          </p:cNvSpPr>
+          <p:nvPr>
+            <p:ph type="title"/>
+          </p:nvPr>
+        </p:nvSpPr>
+        <p:spPr/>
+        <p:txBody>
+          <a:bodyPr/>
+          <a:lstStyle/>
+          <a:p>
+            <a:r>
+              <a:rPr lang="es-CL" dirty="0" err="1" smtClean="0"/>
+              <a:t>Backend</a:t>
+            </a:r>
+            <a:endParaRPr lang="es-CL" dirty="0"/>
+          </a:p>
+        </p:txBody>
+      </p:sp>
+      <p:sp>
+        <p:nvSpPr>
+          <p:cNvPr id="3" name="2 Marcador de contenido"/>
+          <p:cNvSpPr>
+            <a:spLocks noGrp="1"/>
+          </p:cNvSpPr>
+          <p:nvPr>
+            <p:ph idx="1"/>
+          </p:nvPr>
+        </p:nvSpPr>
+        <p:spPr/>
+        <p:txBody>
+          <a:bodyPr/>
+          <a:lstStyle/>
+          <a:p>
+            <a:endParaRPr lang="es-CL" dirty="0"/>
+          </a:p>
+        </p:txBody>
+      </p:sp>
+    </p:spTree>
+  </p:cSld>
+  <p:clrMapOvr>
+    <a:masterClrMapping/>
+  </p:clrMapOvr>
+</p:sld>
+</file>
+
+<file path=ppt/slides/slide11.xml><?xml version="1.0" encoding="utf-8"?>
+<p:sld xmlns:a="http://schemas.openxmlformats.org/drawingml/2006/main" xmlns:r="http://schemas.openxmlformats.org/officeDocument/2006/relationships" xmlns:p="http://schemas.openxmlformats.org/presentationml/2006/main">
+  <p:cSld>
+    <p:spTree>
+      <p:nvGrpSpPr>
+        <p:cNvPr id="1" name=""/>
+        <p:cNvGrpSpPr/>
+        <p:nvPr/>
+      </p:nvGrpSpPr>
+      <p:grpSpPr>
+        <a:xfrm>
+          <a:off x="0" y="0"/>
+          <a:ext cx="0" cy="0"/>
+          <a:chOff x="0" y="0"/>
+          <a:chExt cx="0" cy="0"/>
+        </a:xfrm>
+      </p:grpSpPr>
+      <p:sp>
+        <p:nvSpPr>
+          <p:cNvPr id="2" name="1 Título"/>
+          <p:cNvSpPr>
+            <a:spLocks noGrp="1"/>
+          </p:cNvSpPr>
+          <p:nvPr>
+            <p:ph type="title"/>
+          </p:nvPr>
+        </p:nvSpPr>
+        <p:spPr/>
+        <p:txBody>
+          <a:bodyPr/>
+          <a:lstStyle/>
+          <a:p>
+            <a:r>
+              <a:rPr lang="es-CL" dirty="0" smtClean="0"/>
+              <a:t>Sueldo Programadores según lenguaje</a:t>
+            </a:r>
+            <a:endParaRPr lang="es-CL" dirty="0"/>
+          </a:p>
+        </p:txBody>
+      </p:sp>
+      <p:pic>
+        <p:nvPicPr>
+          <p:cNvPr id="1026" name="Picture 2" descr="https://www.azulweb.net/wp-content/uploads/2017/07/El-sueldo-de-los-programadores-seg%C3%BAn-el-lenguaje.jpg"/>
+          <p:cNvPicPr>
+            <a:picLocks noGrp="1" noChangeAspect="1" noChangeArrowheads="1"/>
+          </p:cNvPicPr>
+          <p:nvPr>
+            <p:ph idx="1"/>
+          </p:nvPr>
+        </p:nvPicPr>
+        <p:blipFill>
+          <a:blip r:embed="rId2"/>
+          <a:srcRect/>
+          <a:stretch>
+            <a:fillRect/>
+          </a:stretch>
+        </p:blipFill>
+        <p:spPr bwMode="auto">
+          <a:xfrm>
+            <a:off x="2514475" y="1745673"/>
+            <a:ext cx="8853881" cy="3991923"/>
+          </a:xfrm>
+          <a:prstGeom prst="rect">
+            <a:avLst/>
+          </a:prstGeom>
+          <a:noFill/>
+        </p:spPr>
+      </p:pic>
+    </p:spTree>
+  </p:cSld>
+  <p:clrMapOvr>
+    <a:masterClrMapping/>
+  </p:clrMapOvr>
+</p:sld>
+</file>
+
+<file path=ppt/slides/slide12.xml><?xml version="1.0" encoding="utf-8"?>
+<p:sld xmlns:a="http://schemas.openxmlformats.org/drawingml/2006/main" xmlns:r="http://schemas.openxmlformats.org/officeDocument/2006/relationships" xmlns:p="http://schemas.openxmlformats.org/presentationml/2006/main">
+  <p:cSld>
+    <p:spTree>
+      <p:nvGrpSpPr>
+        <p:cNvPr id="1" name=""/>
+        <p:cNvGrpSpPr/>
+        <p:nvPr/>
+      </p:nvGrpSpPr>
+      <p:grpSpPr>
+        <a:xfrm>
+          <a:off x="0" y="0"/>
+          <a:ext cx="0" cy="0"/>
+          <a:chOff x="0" y="0"/>
+          <a:chExt cx="0" cy="0"/>
+        </a:xfrm>
+      </p:grpSpPr>
+      <p:sp>
+        <p:nvSpPr>
+          <p:cNvPr id="2" name="1 Título"/>
+          <p:cNvSpPr>
+            <a:spLocks noGrp="1"/>
+          </p:cNvSpPr>
+          <p:nvPr>
+            <p:ph type="title"/>
+          </p:nvPr>
+        </p:nvSpPr>
+        <p:spPr/>
+        <p:txBody>
+          <a:bodyPr/>
+          <a:lstStyle/>
+          <a:p>
+            <a:r>
+              <a:rPr lang="es-CL" dirty="0" smtClean="0"/>
+              <a:t>Sueldo Programadores según lenguaje</a:t>
+            </a:r>
+            <a:endParaRPr lang="es-CL" dirty="0"/>
+          </a:p>
+        </p:txBody>
+      </p:sp>
+      <p:pic>
+        <p:nvPicPr>
+          <p:cNvPr id="30722" name="Picture 2" descr="https://www.azulweb.net/wp-content/uploads/2017/07/El-sueldo-de-los-programadores-seg%C3%BAn-su-puesto-de-trabajo.jpg"/>
+          <p:cNvPicPr>
+            <a:picLocks noChangeAspect="1" noChangeArrowheads="1"/>
+          </p:cNvPicPr>
+          <p:nvPr/>
+        </p:nvPicPr>
+        <p:blipFill>
+          <a:blip r:embed="rId2"/>
+          <a:srcRect/>
+          <a:stretch>
+            <a:fillRect/>
+          </a:stretch>
+        </p:blipFill>
+        <p:spPr bwMode="auto">
+          <a:xfrm>
+            <a:off x="1438110" y="1589830"/>
+            <a:ext cx="10380756" cy="4680342"/>
+          </a:xfrm>
+          <a:prstGeom prst="rect">
+            <a:avLst/>
+          </a:prstGeom>
+          <a:noFill/>
+        </p:spPr>
+      </p:pic>
+    </p:spTree>
+  </p:cSld>
+  <p:clrMapOvr>
+    <a:masterClrMapping/>
+  </p:clrMapOvr>
+</p:sld>
+</file>
+
+<file path=ppt/slides/slide13.xml><?xml version="1.0" encoding="utf-8"?>
+<p:sld xmlns:a="http://schemas.openxmlformats.org/drawingml/2006/main" xmlns:r="http://schemas.openxmlformats.org/officeDocument/2006/relationships" xmlns:p="http://schemas.openxmlformats.org/presentationml/2006/main">
+  <p:cSld>
+    <p:spTree>
+      <p:nvGrpSpPr>
+        <p:cNvPr id="1" name=""/>
+        <p:cNvGrpSpPr/>
+        <p:nvPr/>
+      </p:nvGrpSpPr>
+      <p:grpSpPr>
+        <a:xfrm>
+          <a:off x="0" y="0"/>
+          <a:ext cx="0" cy="0"/>
+          <a:chOff x="0" y="0"/>
+          <a:chExt cx="0" cy="0"/>
+        </a:xfrm>
+      </p:grpSpPr>
+      <p:sp>
+        <p:nvSpPr>
+          <p:cNvPr id="2" name="1 Título"/>
+          <p:cNvSpPr>
+            <a:spLocks noGrp="1"/>
+          </p:cNvSpPr>
+          <p:nvPr>
+            <p:ph type="title"/>
+          </p:nvPr>
+        </p:nvSpPr>
+        <p:spPr/>
+        <p:txBody>
+          <a:bodyPr/>
+          <a:lstStyle/>
+          <a:p>
+            <a:r>
+              <a:rPr lang="es-CL" dirty="0" smtClean="0"/>
+              <a:t>Lenguajes Populares y prometedores</a:t>
+            </a:r>
+            <a:endParaRPr lang="es-CL" dirty="0"/>
+          </a:p>
+        </p:txBody>
+      </p:sp>
+      <p:pic>
+        <p:nvPicPr>
+          <p:cNvPr id="29702" name="Picture 6" descr="https://www.azulweb.net/wp-content/uploads/2017/01/1.jpg"/>
+          <p:cNvPicPr>
+            <a:picLocks noChangeAspect="1" noChangeArrowheads="1"/>
+          </p:cNvPicPr>
+          <p:nvPr/>
+        </p:nvPicPr>
+        <p:blipFill>
+          <a:blip r:embed="rId2"/>
+          <a:srcRect/>
+          <a:stretch>
+            <a:fillRect/>
+          </a:stretch>
+        </p:blipFill>
+        <p:spPr bwMode="auto">
+          <a:xfrm>
+            <a:off x="2720645" y="1449840"/>
+            <a:ext cx="6115050" cy="4876801"/>
+          </a:xfrm>
+          <a:prstGeom prst="rect">
+            <a:avLst/>
+          </a:prstGeom>
+          <a:noFill/>
+        </p:spPr>
+      </p:pic>
+    </p:spTree>
+  </p:cSld>
+  <p:clrMapOvr>
+    <a:masterClrMapping/>
+  </p:clrMapOvr>
+</p:sld>
+</file>
+
+<file path=ppt/slides/slide14.xml><?xml version="1.0" encoding="utf-8"?>
+<p:sld xmlns:a="http://schemas.openxmlformats.org/drawingml/2006/main" xmlns:r="http://schemas.openxmlformats.org/officeDocument/2006/relationships" xmlns:p="http://schemas.openxmlformats.org/presentationml/2006/main">
+  <p:cSld>
+    <p:spTree>
+      <p:nvGrpSpPr>
+        <p:cNvPr id="1" name=""/>
+        <p:cNvGrpSpPr/>
+        <p:nvPr/>
+      </p:nvGrpSpPr>
+      <p:grpSpPr>
+        <a:xfrm>
+          <a:off x="0" y="0"/>
+          <a:ext cx="0" cy="0"/>
+          <a:chOff x="0" y="0"/>
+          <a:chExt cx="0" cy="0"/>
+        </a:xfrm>
+      </p:grpSpPr>
+      <p:sp>
+        <p:nvSpPr>
+          <p:cNvPr id="2" name="1 Título"/>
+          <p:cNvSpPr>
+            <a:spLocks noGrp="1"/>
+          </p:cNvSpPr>
+          <p:nvPr>
+            <p:ph type="title"/>
+          </p:nvPr>
+        </p:nvSpPr>
+        <p:spPr/>
+        <p:txBody>
+          <a:bodyPr/>
+          <a:lstStyle/>
+          <a:p>
+            <a:r>
+              <a:rPr lang="es-CL" dirty="0" smtClean="0"/>
+              <a:t>Nube</a:t>
+            </a:r>
+            <a:endParaRPr lang="es-CL" dirty="0"/>
+          </a:p>
+        </p:txBody>
+      </p:sp>
+      <p:sp>
+        <p:nvSpPr>
+          <p:cNvPr id="3" name="2 Marcador de contenido"/>
+          <p:cNvSpPr>
+            <a:spLocks noGrp="1"/>
+          </p:cNvSpPr>
+          <p:nvPr>
+            <p:ph idx="1"/>
+          </p:nvPr>
+        </p:nvSpPr>
+        <p:spPr/>
+        <p:txBody>
+          <a:bodyPr/>
+          <a:lstStyle/>
+          <a:p>
+            <a:r>
+              <a:rPr lang="es-CL" dirty="0" smtClean="0"/>
+              <a:t>Amazon</a:t>
+            </a:r>
+          </a:p>
+          <a:p>
+            <a:r>
+              <a:rPr lang="es-CL" dirty="0" smtClean="0"/>
+              <a:t>Google</a:t>
+            </a:r>
+          </a:p>
+          <a:p>
+            <a:r>
+              <a:rPr lang="es-CL" dirty="0" err="1" smtClean="0"/>
+              <a:t>Heroku</a:t>
+            </a:r>
+            <a:endParaRPr lang="es-CL" dirty="0" smtClean="0"/>
+          </a:p>
+          <a:p>
+            <a:pPr>
+              <a:buNone/>
+            </a:pPr>
+            <a:endParaRPr lang="es-CL" dirty="0"/>
+          </a:p>
+        </p:txBody>
+      </p:sp>
+    </p:spTree>
+  </p:cSld>
+  <p:clrMapOvr>
+    <a:masterClrMapping/>
+  </p:clrMapOvr>
+</p:sld>
+</file>
+
+<file path=ppt/slides/slide15.xml><?xml version="1.0" encoding="utf-8"?>
+<p:sld xmlns:a="http://schemas.openxmlformats.org/drawingml/2006/main" xmlns:r="http://schemas.openxmlformats.org/officeDocument/2006/relationships" xmlns:p="http://schemas.openxmlformats.org/presentationml/2006/main">
+  <p:cSld>
+    <p:spTree>
+      <p:nvGrpSpPr>
+        <p:cNvPr id="1" name=""/>
+        <p:cNvGrpSpPr/>
+        <p:nvPr/>
+      </p:nvGrpSpPr>
+      <p:grpSpPr>
+        <a:xfrm>
+          <a:off x="0" y="0"/>
+          <a:ext cx="0" cy="0"/>
+          <a:chOff x="0" y="0"/>
+          <a:chExt cx="0" cy="0"/>
+        </a:xfrm>
+      </p:grpSpPr>
+      <p:sp>
+        <p:nvSpPr>
+          <p:cNvPr id="2" name="1 Título"/>
+          <p:cNvSpPr>
+            <a:spLocks noGrp="1"/>
+          </p:cNvSpPr>
+          <p:nvPr>
+            <p:ph type="title"/>
+          </p:nvPr>
+        </p:nvSpPr>
+        <p:spPr/>
+        <p:txBody>
+          <a:bodyPr/>
+          <a:lstStyle/>
+          <a:p>
+            <a:r>
+              <a:rPr lang="es-CL" dirty="0" err="1" smtClean="0"/>
+              <a:t>DevOps</a:t>
+            </a:r>
+            <a:endParaRPr lang="es-CL" dirty="0"/>
+          </a:p>
+        </p:txBody>
+      </p:sp>
+      <p:sp>
+        <p:nvSpPr>
+          <p:cNvPr id="3" name="2 Marcador de contenido"/>
+          <p:cNvSpPr>
+            <a:spLocks noGrp="1"/>
+          </p:cNvSpPr>
+          <p:nvPr>
+            <p:ph idx="1"/>
+          </p:nvPr>
+        </p:nvSpPr>
+        <p:spPr/>
+        <p:txBody>
+          <a:bodyPr/>
+          <a:lstStyle/>
+          <a:p>
+            <a:r>
+              <a:rPr lang="es-CL" dirty="0" smtClean="0"/>
+              <a:t>Es </a:t>
+            </a:r>
+            <a:r>
+              <a:rPr lang="es-CL" dirty="0" smtClean="0"/>
+              <a:t>un </a:t>
+            </a:r>
+            <a:r>
+              <a:rPr lang="es-CL" dirty="0" smtClean="0">
+                <a:hlinkClick r:id="rId2" tooltip="Acrónimo"/>
+              </a:rPr>
+              <a:t>acrónimo</a:t>
+            </a:r>
+            <a:r>
+              <a:rPr lang="es-CL" dirty="0" smtClean="0"/>
+              <a:t> inglés de </a:t>
+            </a:r>
+            <a:r>
+              <a:rPr lang="es-CL" i="1" dirty="0" err="1" smtClean="0"/>
+              <a:t>development</a:t>
+            </a:r>
+            <a:r>
+              <a:rPr lang="es-CL" dirty="0" smtClean="0"/>
+              <a:t> (</a:t>
+            </a:r>
+            <a:r>
+              <a:rPr lang="es-CL" dirty="0" smtClean="0">
+                <a:hlinkClick r:id="rId3" tooltip="Desarrollo de software"/>
+              </a:rPr>
+              <a:t>desarrollo</a:t>
+            </a:r>
+            <a:r>
+              <a:rPr lang="es-CL" dirty="0" smtClean="0"/>
+              <a:t>) y </a:t>
+            </a:r>
+            <a:r>
+              <a:rPr lang="es-CL" i="1" dirty="0" err="1" smtClean="0"/>
+              <a:t>operations</a:t>
+            </a:r>
+            <a:r>
+              <a:rPr lang="es-CL" dirty="0" smtClean="0"/>
+              <a:t> (</a:t>
+            </a:r>
+            <a:r>
+              <a:rPr lang="es-CL" dirty="0" smtClean="0">
+                <a:hlinkClick r:id="rId4" tooltip="Operaciones (IT) (aún no redactado)"/>
+              </a:rPr>
+              <a:t>operaciones</a:t>
+            </a:r>
+            <a:r>
+              <a:rPr lang="es-CL" dirty="0" smtClean="0"/>
+              <a:t>), es un </a:t>
+            </a:r>
+            <a:r>
+              <a:rPr lang="es-CL" dirty="0" smtClean="0">
+                <a:hlinkClick r:id="rId5" tooltip="Proceso de desarrollo de software"/>
+              </a:rPr>
+              <a:t>desarrollo de software</a:t>
+            </a:r>
+            <a:r>
+              <a:rPr lang="es-CL" dirty="0" smtClean="0"/>
+              <a:t> y el </a:t>
+            </a:r>
+            <a:r>
+              <a:rPr lang="es-CL" dirty="0" smtClean="0">
+                <a:hlinkClick r:id="rId6" tooltip="Despliegue de software"/>
+              </a:rPr>
+              <a:t>proceso de entrega</a:t>
+            </a:r>
+            <a:r>
+              <a:rPr lang="es-CL" dirty="0" smtClean="0"/>
+              <a:t> que hace hincapié en </a:t>
+            </a:r>
+            <a:r>
+              <a:rPr lang="es-CL" dirty="0" smtClean="0">
+                <a:hlinkClick r:id="rId7" tooltip="Comunicación"/>
+              </a:rPr>
+              <a:t>la comunicación</a:t>
+            </a:r>
+            <a:r>
+              <a:rPr lang="es-CL" dirty="0" smtClean="0"/>
+              <a:t> y </a:t>
+            </a:r>
+            <a:r>
+              <a:rPr lang="es-CL" dirty="0" smtClean="0">
+                <a:hlinkClick r:id="rId8" tooltip="Colaboración"/>
+              </a:rPr>
+              <a:t>la colaboración</a:t>
+            </a:r>
+            <a:r>
+              <a:rPr lang="es-CL" dirty="0" smtClean="0"/>
+              <a:t> entre la gestión de productos, desarrollo de software y profesionales de operaciones</a:t>
+            </a:r>
+            <a:endParaRPr lang="es-CL" dirty="0" smtClean="0"/>
+          </a:p>
+          <a:p>
+            <a:endParaRPr lang="es-CL" dirty="0" smtClean="0"/>
+          </a:p>
+          <a:p>
+            <a:r>
+              <a:rPr lang="es-CL" dirty="0" smtClean="0"/>
+              <a:t>Automatiza el proceso de entrega del software y los cambios en la infraestructura. Su objetivo es ayudar a crear un entorno donde la construcción, prueba y lanzamiento de un software pueda ser más rápido y con mayor </a:t>
+            </a:r>
+            <a:r>
+              <a:rPr lang="es-CL" b="1" dirty="0" smtClean="0"/>
+              <a:t>fiabilidad</a:t>
+            </a:r>
+            <a:endParaRPr lang="es-CL" dirty="0"/>
+          </a:p>
+        </p:txBody>
+      </p:sp>
+    </p:spTree>
+  </p:cSld>
+  <p:clrMapOvr>
+    <a:masterClrMapping/>
+  </p:clrMapOvr>
+</p:sld>
+</file>
+
+<file path=ppt/slides/slide16.xml><?xml version="1.0" encoding="utf-8"?>
+<p:sld xmlns:a="http://schemas.openxmlformats.org/drawingml/2006/main" xmlns:r="http://schemas.openxmlformats.org/officeDocument/2006/relationships" xmlns:p="http://schemas.openxmlformats.org/presentationml/2006/main">
+  <p:cSld>
+    <p:spTree>
+      <p:nvGrpSpPr>
+        <p:cNvPr id="1" name=""/>
+        <p:cNvGrpSpPr/>
+        <p:nvPr/>
+      </p:nvGrpSpPr>
+      <p:grpSpPr>
+        <a:xfrm>
+          <a:off x="0" y="0"/>
+          <a:ext cx="0" cy="0"/>
+          <a:chOff x="0" y="0"/>
+          <a:chExt cx="0" cy="0"/>
+        </a:xfrm>
+      </p:grpSpPr>
+      <p:sp>
+        <p:nvSpPr>
+          <p:cNvPr id="2" name="1 Título"/>
+          <p:cNvSpPr>
+            <a:spLocks noGrp="1"/>
+          </p:cNvSpPr>
+          <p:nvPr>
+            <p:ph type="title"/>
+          </p:nvPr>
+        </p:nvSpPr>
+        <p:spPr/>
+        <p:txBody>
+          <a:bodyPr/>
+          <a:lstStyle/>
+          <a:p>
+            <a:endParaRPr lang="es-CL"/>
+          </a:p>
+        </p:txBody>
+      </p:sp>
+      <p:sp>
+        <p:nvSpPr>
+          <p:cNvPr id="3" name="2 Marcador de contenido"/>
+          <p:cNvSpPr>
+            <a:spLocks noGrp="1"/>
+          </p:cNvSpPr>
+          <p:nvPr>
+            <p:ph idx="1"/>
+          </p:nvPr>
+        </p:nvSpPr>
+        <p:spPr/>
+        <p:txBody>
+          <a:bodyPr/>
+          <a:lstStyle/>
+          <a:p>
+            <a:endParaRPr lang="es-CL"/>
+          </a:p>
+        </p:txBody>
+      </p:sp>
+    </p:spTree>
+  </p:cSld>
+  <p:clrMapOvr>
+    <a:masterClrMapping/>
+  </p:clrMapOvr>
+</p:sld>
+</file>
+
+<file path=ppt/slides/slide17.xml><?xml version="1.0" encoding="utf-8"?>
+<p:sld xmlns:a="http://schemas.openxmlformats.org/drawingml/2006/main" xmlns:r="http://schemas.openxmlformats.org/officeDocument/2006/relationships" xmlns:p="http://schemas.openxmlformats.org/presentationml/2006/main">
+  <p:cSld>
+    <p:spTree>
+      <p:nvGrpSpPr>
+        <p:cNvPr id="1" name=""/>
+        <p:cNvGrpSpPr/>
+        <p:nvPr/>
+      </p:nvGrpSpPr>
+      <p:grpSpPr>
+        <a:xfrm>
+          <a:off x="0" y="0"/>
+          <a:ext cx="0" cy="0"/>
+          <a:chOff x="0" y="0"/>
+          <a:chExt cx="0" cy="0"/>
+        </a:xfrm>
+      </p:grpSpPr>
+      <p:sp>
+        <p:nvSpPr>
+          <p:cNvPr id="2" name="1 Título"/>
+          <p:cNvSpPr>
+            <a:spLocks noGrp="1"/>
+          </p:cNvSpPr>
+          <p:nvPr>
+            <p:ph type="title"/>
+          </p:nvPr>
+        </p:nvSpPr>
+        <p:spPr/>
+        <p:txBody>
+          <a:bodyPr/>
+          <a:lstStyle/>
+          <a:p>
+            <a:r>
+              <a:rPr lang="es-CL" dirty="0" err="1" smtClean="0"/>
+              <a:t>DevOps</a:t>
+            </a:r>
+            <a:endParaRPr lang="es-CL" dirty="0"/>
+          </a:p>
+        </p:txBody>
+      </p:sp>
+      <p:sp>
+        <p:nvSpPr>
+          <p:cNvPr id="3" name="2 Marcador de contenido"/>
+          <p:cNvSpPr>
+            <a:spLocks noGrp="1"/>
+          </p:cNvSpPr>
+          <p:nvPr>
+            <p:ph idx="1"/>
+          </p:nvPr>
+        </p:nvSpPr>
+        <p:spPr/>
+        <p:txBody>
+          <a:bodyPr/>
+          <a:lstStyle/>
+          <a:p>
+            <a:r>
+              <a:rPr lang="es-CL" b="1" dirty="0" err="1" smtClean="0"/>
+              <a:t>Travis</a:t>
+            </a:r>
+            <a:r>
+              <a:rPr lang="es-CL" b="1" dirty="0" smtClean="0"/>
+              <a:t> CI</a:t>
+            </a:r>
+          </a:p>
+          <a:p>
+            <a:r>
+              <a:rPr lang="es-CL" b="1" dirty="0" smtClean="0"/>
+              <a:t>sistema distribuido de integración continua libre integrado con </a:t>
+            </a:r>
+            <a:r>
+              <a:rPr lang="es-CL" b="1" dirty="0" err="1" smtClean="0"/>
+              <a:t>Github</a:t>
+            </a:r>
+            <a:endParaRPr lang="es-CL" b="1" dirty="0" smtClean="0"/>
+          </a:p>
+          <a:p>
+            <a:r>
+              <a:rPr lang="es-CL" dirty="0" err="1" smtClean="0">
+                <a:hlinkClick r:id="rId2" tooltip="Puppet (software)"/>
+              </a:rPr>
+              <a:t>Puppet</a:t>
+            </a:r>
+            <a:r>
+              <a:rPr lang="es-CL" dirty="0" smtClean="0">
+                <a:hlinkClick r:id="rId2" tooltip="Puppet (software)"/>
+              </a:rPr>
+              <a:t> (software)</a:t>
+            </a:r>
+            <a:endParaRPr lang="es-CL" dirty="0" smtClean="0"/>
+          </a:p>
+          <a:p>
+            <a:r>
+              <a:rPr lang="es-CL" dirty="0" err="1" smtClean="0">
+                <a:hlinkClick r:id="rId3" tooltip="Ansible (software)"/>
+              </a:rPr>
+              <a:t>Ansible</a:t>
+            </a:r>
+            <a:r>
+              <a:rPr lang="es-CL" dirty="0" smtClean="0">
+                <a:hlinkClick r:id="rId3" tooltip="Ansible (software)"/>
+              </a:rPr>
+              <a:t> (software)</a:t>
+            </a:r>
+            <a:endParaRPr lang="es-CL" dirty="0" smtClean="0"/>
+          </a:p>
+          <a:p>
+            <a:r>
+              <a:rPr lang="es-CL" dirty="0" smtClean="0">
+                <a:hlinkClick r:id="rId4" tooltip="Chef (software) (aún no redactado)"/>
+              </a:rPr>
+              <a:t>Chef (software)</a:t>
+            </a:r>
+            <a:endParaRPr lang="es-CL" dirty="0" smtClean="0"/>
+          </a:p>
+          <a:p>
+            <a:r>
+              <a:rPr lang="es-CL" dirty="0" err="1" smtClean="0">
+                <a:hlinkClick r:id="rId5"/>
+              </a:rPr>
+              <a:t>Docker</a:t>
+            </a:r>
+            <a:r>
+              <a:rPr lang="es-CL" dirty="0" smtClean="0">
+                <a:hlinkClick r:id="rId5"/>
+              </a:rPr>
+              <a:t> (software)</a:t>
+            </a:r>
+            <a:endParaRPr lang="es-CL" dirty="0" smtClean="0"/>
+          </a:p>
+          <a:p>
+            <a:r>
+              <a:rPr lang="es-CL" dirty="0" err="1" smtClean="0">
+                <a:hlinkClick r:id="rId6" tooltip="Clarive"/>
+              </a:rPr>
+              <a:t>Clarive</a:t>
+            </a:r>
+            <a:r>
+              <a:rPr lang="es-CL" dirty="0" smtClean="0">
+                <a:hlinkClick r:id="rId6" tooltip="Clarive"/>
+              </a:rPr>
+              <a:t> (software)</a:t>
+            </a:r>
+            <a:endParaRPr lang="es-CL" dirty="0" smtClean="0"/>
+          </a:p>
+          <a:p>
+            <a:endParaRPr lang="es-CL" b="1" dirty="0" smtClean="0"/>
+          </a:p>
+          <a:p>
+            <a:endParaRPr lang="es-CL" dirty="0"/>
+          </a:p>
+        </p:txBody>
+      </p:sp>
+    </p:spTree>
   </p:cSld>
   <p:clrMapOvr>
     <a:masterClrMapping/>
@@ -7770,7 +8558,15 @@
             </a:r>
             <a:r>
               <a:rPr lang="es-CL" dirty="0"/>
-              <a:t>todas aquellas tecnologías que corren del lado del cliente, es decir, todas aquellas tecnologías que corren del lado del navegador </a:t>
+              <a:t>todas aquellas tecnologías que corren del lado del cliente, es decir, todas </a:t>
+            </a:r>
+            <a:r>
+              <a:rPr lang="es-CL" dirty="0" smtClean="0"/>
+              <a:t>las </a:t>
+            </a:r>
+            <a:r>
+              <a:rPr lang="es-CL" dirty="0"/>
+              <a:t>corren del lado del navegador </a:t>
             </a:r>
             <a:r>
               <a:rPr lang="es-CL" dirty="0" smtClean="0"/>
@@ -7813,7 +8609,7 @@
     </p:spTree>
     <p:extLst>
       <p:ext uri="{BB962C8B-B14F-4D97-AF65-F5344CB8AC3E}">
-        <p14:creationId xmlns:p14="http://schemas.microsoft.com/office/powerpoint/2010/main" val="3506725205"/>
+        <p14:creationId xmlns:p14="http://schemas.microsoft.com/office/powerpoint/2010/main" xmlns="" val="3506725205"/>
       </p:ext>
     </p:extLst>
   </p:cSld>
@@ -7969,7 +8765,7 @@
     </p:spTree>
     <p:extLst>
       <p:ext uri="{BB962C8B-B14F-4D97-AF65-F5344CB8AC3E}">
-        <p14:creationId xmlns:p14="http://schemas.microsoft.com/office/powerpoint/2010/main" val="3093633255"/>
+        <p14:creationId xmlns:p14="http://schemas.microsoft.com/office/powerpoint/2010/main" xmlns="" val="3093633255"/>
       </p:ext>
     </p:extLst>
   </p:cSld>
@@ -8083,7 +8879,7 @@
     </p:spTree>
     <p:extLst>
       <p:ext uri="{BB962C8B-B14F-4D97-AF65-F5344CB8AC3E}">
-        <p14:creationId xmlns:p14="http://schemas.microsoft.com/office/powerpoint/2010/main" val="13199986"/>
+        <p14:creationId xmlns:p14="http://schemas.microsoft.com/office/powerpoint/2010/main" xmlns="" val="13199986"/>
       </p:ext>
     </p:extLst>
   </p:cSld>
@@ -8167,32 +8963,20 @@
               <a:buNone/>
             </a:pPr>
             <a:r>
+              <a:rPr lang="es-CL" dirty="0" smtClean="0"/>
+              <a:t>Por </a:t>
+            </a:r>
+            <a:r>
               <a:rPr lang="es-CL" dirty="0"/>
-              <a:t>Un </a:t>
-            </a:r>
-            <a:r>
-              <a:rPr lang="es-CL" dirty="0" err="1"/>
-              <a:t>framework</a:t>
+              <a:t>lo general, se define como aquella aplicación o conjunto de módulos que </a:t>
+            </a:r>
+            <a:r>
+              <a:rPr lang="es-CL" dirty="0" smtClean="0"/>
+              <a:t>permiten o </a:t>
             </a:r>
             <a:r>
               <a:rPr lang="es-CL" dirty="0"/>
-              <a:t>, por lo general, se define como aquella </a:t>
-            </a:r>
-            <a:r>
-              <a:rPr lang="es-CL" b="1" dirty="0"/>
-              <a:t>aplicación o conjunto de módulos que permiten</a:t>
-            </a:r>
-            <a:r>
-              <a:rPr lang="es-CL" dirty="0"/>
-              <a:t>, o tienen por objetivo, </a:t>
-            </a:r>
-            <a:r>
-              <a:rPr lang="es-CL" b="1" dirty="0"/>
-              <a:t>el desarrollo ágil de aplicaciones</a:t>
-            </a:r>
-            <a:r>
-              <a:rPr lang="es-CL" dirty="0"/>
-              <a:t> mediante la aportación de librerías y/o funcionalidades ya creadas para que nosotros las usemos directamente</a:t>
+              <a:t>tienen por objetivo, el desarrollo ágil de aplicaciones mediante la aportación de librerías y/o funcionalidades ya creadas para que nosotros las usemos directamente</a:t>
             </a:r>
             <a:r>
               <a:rPr lang="es-CL" dirty="0" smtClean="0"/>
@@ -8211,15 +8995,7 @@
             </a:pPr>
             <a:r>
               <a:rPr lang="es-CL" dirty="0"/>
-              <a:t>El </a:t>
-            </a:r>
-            <a:r>
-              <a:rPr lang="es-CL" b="1" dirty="0"/>
-              <a:t>objetivo</a:t>
-            </a:r>
-            <a:r>
-              <a:rPr lang="es-CL" dirty="0"/>
-              <a:t> de los </a:t>
+              <a:t>El objetivo de los </a:t>
             </a:r>
             <a:r>
               <a:rPr lang="es-CL" dirty="0" err="1"/>
@@ -8227,15 +9003,11 @@
             </a:r>
             <a:r>
               <a:rPr lang="es-CL" dirty="0"/>
-              <a:t> es hacer </a:t>
-            </a:r>
-            <a:r>
-              <a:rPr lang="es-CL" b="1" dirty="0"/>
-              <a:t>que nos centremos en el verdadero problema</a:t>
-            </a:r>
-            <a:r>
-              <a:rPr lang="es-CL" dirty="0"/>
-              <a:t>, y no preocuparnos por implementar funcionalidades que son de uso común en muchas aplicaciones</a:t>
+              <a:t> es hacer que nos centremos en el verdadero problema, y no preocuparnos por implementar funcionalidades que son de uso común en muchas </a:t>
+            </a:r>
+            <a:r>
+              <a:rPr lang="es-CL" dirty="0" smtClean="0"/>
+              <a:t>aplicaciones.</a:t>
             </a:r>
             <a:endParaRPr lang="en-US" dirty="0"/>
           </a:p>
@@ -8244,7 +9016,7 @@
     </p:spTree>
     <p:extLst>
       <p:ext uri="{BB962C8B-B14F-4D97-AF65-F5344CB8AC3E}">
-        <p14:creationId xmlns:p14="http://schemas.microsoft.com/office/powerpoint/2010/main" val="3729902968"/>
+        <p14:creationId xmlns:p14="http://schemas.microsoft.com/office/powerpoint/2010/main" xmlns="" val="3729902968"/>
       </p:ext>
     </p:extLst>
   </p:cSld>
@@ -8328,61 +9100,38 @@
           <a:p>
             <a:pPr lvl="1"/>
             <a:r>
-              <a:rPr lang="en-US" dirty="0" err="1"/>
-              <a:t>Convención</a:t>
-            </a:r>
-            <a:r>
-              <a:rPr lang="en-US" dirty="0"/>
-              <a:t> </a:t>
-            </a:r>
-            <a:r>
-              <a:rPr lang="en-US" dirty="0" err="1"/>
-              <a:t>sobre</a:t>
-            </a:r>
-            <a:r>
-              <a:rPr lang="en-US" dirty="0"/>
-              <a:t> </a:t>
-            </a:r>
-            <a:r>
-              <a:rPr lang="en-US" dirty="0" err="1" smtClean="0"/>
-              <a:t>configuración</a:t>
-            </a:r>
-            <a:endParaRPr lang="en-US" dirty="0" smtClean="0"/>
+              <a:rPr lang="es-CL" dirty="0" smtClean="0"/>
+              <a:t>Convención sobre configuración</a:t>
+            </a:r>
           </a:p>
           <a:p>
             <a:pPr lvl="1"/>
             <a:r>
-              <a:rPr lang="en-US" dirty="0"/>
-              <a:t>El </a:t>
-            </a:r>
-            <a:r>
-              <a:rPr lang="en-US" dirty="0" err="1" smtClean="0"/>
-              <a:t>código</a:t>
-            </a:r>
-            <a:r>
-              <a:rPr lang="en-US" dirty="0" smtClean="0"/>
-              <a:t> </a:t>
-            </a:r>
-            <a:r>
-              <a:rPr lang="en-US" dirty="0" err="1" smtClean="0"/>
-              <a:t>testeado</a:t>
-            </a:r>
-            <a:endParaRPr lang="en-US" dirty="0" smtClean="0"/>
+              <a:rPr lang="es-CL" dirty="0" smtClean="0"/>
+              <a:t>El código testeado</a:t>
+            </a:r>
           </a:p>
           <a:p>
             <a:pPr lvl="1"/>
             <a:r>
               <a:rPr lang="es-CL" dirty="0" smtClean="0"/>
-              <a:t>Comunidad usuarios</a:t>
+              <a:t>Comunidad </a:t>
+            </a:r>
+            <a:r>
+              <a:rPr lang="es-CL" dirty="0" smtClean="0"/>
+              <a:t>usuarios</a:t>
             </a:r>
           </a:p>
           <a:p>
             <a:pPr lvl="1"/>
             <a:r>
               <a:rPr lang="es-CL" dirty="0" smtClean="0"/>
-              <a:t>Trabajo en equipo</a:t>
-            </a:r>
-            <a:endParaRPr lang="en-US" dirty="0" smtClean="0"/>
+              <a:t>Trabajo en </a:t>
+            </a:r>
+            <a:r>
+              <a:rPr lang="es-CL" dirty="0" smtClean="0"/>
+              <a:t>equipo</a:t>
+            </a:r>
           </a:p>
           <a:p>
             <a:pPr lvl="1"/>
@@ -8413,7 +9162,7 @@
     </p:spTree>
     <p:extLst>
       <p:ext uri="{BB962C8B-B14F-4D97-AF65-F5344CB8AC3E}">
-        <p14:creationId xmlns:p14="http://schemas.microsoft.com/office/powerpoint/2010/main" val="1754372852"/>
+        <p14:creationId xmlns:p14="http://schemas.microsoft.com/office/powerpoint/2010/main" xmlns="" val="1754372852"/>
       </p:ext>
     </p:extLst>
   </p:cSld>
@@ -8459,7 +9208,7 @@
           <a:blip r:embed="rId2">
             <a:extLst>
               <a:ext uri="{28A0092B-C50C-407E-A947-70E740481C1C}">
-                <a14:useLocalDpi xmlns:a14="http://schemas.microsoft.com/office/drawing/2010/main" val="0"/>
+                <a14:useLocalDpi xmlns:a14="http://schemas.microsoft.com/office/drawing/2010/main" xmlns="" val="0"/>
               </a:ext>
             </a:extLst>
           </a:blip>
@@ -8479,7 +9228,7 @@
           <a:noFill/>
           <a:extLst>
             <a:ext uri="{909E8E84-426E-40DD-AFC4-6F175D3DCCD1}">
-              <a14:hiddenFill xmlns:a14="http://schemas.microsoft.com/office/drawing/2010/main">
+              <a14:hiddenFill xmlns:a14="http://schemas.microsoft.com/office/drawing/2010/main" xmlns="">
                 <a:solidFill>
                   <a:srgbClr val="FFFFFF"/>
                 </a:solidFill>
@@ -8491,7 +9240,7 @@
     </p:spTree>
     <p:extLst>
       <p:ext uri="{BB962C8B-B14F-4D97-AF65-F5344CB8AC3E}">
-        <p14:creationId xmlns:p14="http://schemas.microsoft.com/office/powerpoint/2010/main" val="1312231755"/>
+        <p14:creationId xmlns:p14="http://schemas.microsoft.com/office/powerpoint/2010/main" xmlns="" val="1312231755"/>
       </p:ext>
     </p:extLst>
   </p:cSld>
@@ -8505,6 +9254,435 @@
       </p:par>
     </p:tnLst>
   </p:timing>
+</p:sld>
+</file>
+
+<file path=ppt/slides/slide8.xml><?xml version="1.0" encoding="utf-8"?>
+<p:sld xmlns:a="http://schemas.openxmlformats.org/drawingml/2006/main" xmlns:r="http://schemas.openxmlformats.org/officeDocument/2006/relationships" xmlns:p="http://schemas.openxmlformats.org/presentationml/2006/main">
+  <p:cSld>
+    <p:spTree>
+      <p:nvGrpSpPr>
+        <p:cNvPr id="1" name=""/>
+        <p:cNvGrpSpPr/>
+        <p:nvPr/>
+      </p:nvGrpSpPr>
+      <p:grpSpPr>
+        <a:xfrm>
+          <a:off x="0" y="0"/>
+          <a:ext cx="0" cy="0"/>
+          <a:chOff x="0" y="0"/>
+          <a:chExt cx="0" cy="0"/>
+        </a:xfrm>
+      </p:grpSpPr>
+      <p:sp>
+        <p:nvSpPr>
+          <p:cNvPr id="2" name="1 Título"/>
+          <p:cNvSpPr>
+            <a:spLocks noGrp="1"/>
+          </p:cNvSpPr>
+          <p:nvPr>
+            <p:ph type="title"/>
+          </p:nvPr>
+        </p:nvSpPr>
+        <p:spPr/>
+        <p:txBody>
+          <a:bodyPr/>
+          <a:lstStyle/>
+          <a:p>
+            <a:r>
+              <a:rPr lang="es-CL" dirty="0" err="1" smtClean="0"/>
+              <a:t>Backend</a:t>
+            </a:r>
+            <a:endParaRPr lang="es-CL" dirty="0"/>
+          </a:p>
+        </p:txBody>
+      </p:sp>
+      <p:sp>
+        <p:nvSpPr>
+          <p:cNvPr id="3" name="2 Marcador de contenido"/>
+          <p:cNvSpPr>
+            <a:spLocks noGrp="1"/>
+          </p:cNvSpPr>
+          <p:nvPr>
+            <p:ph idx="1"/>
+          </p:nvPr>
+        </p:nvSpPr>
+        <p:spPr/>
+        <p:txBody>
+          <a:bodyPr/>
+          <a:lstStyle/>
+          <a:p>
+            <a:r>
+              <a:rPr lang="es-CL" dirty="0" smtClean="0"/>
+              <a:t>Es </a:t>
+            </a:r>
+            <a:r>
+              <a:rPr lang="es-CL" dirty="0" smtClean="0"/>
+              <a:t>aquel que se encuentra del lado del </a:t>
+            </a:r>
+            <a:r>
+              <a:rPr lang="es-CL" dirty="0" smtClean="0"/>
+              <a:t>servidor</a:t>
+            </a:r>
+          </a:p>
+          <a:p>
+            <a:r>
+              <a:rPr lang="es-CL" dirty="0" smtClean="0"/>
+              <a:t>Se </a:t>
+            </a:r>
+            <a:r>
+              <a:rPr lang="es-CL" dirty="0" smtClean="0"/>
+              <a:t>encarga de manipulación de los datos </a:t>
+            </a:r>
+            <a:r>
+              <a:rPr lang="es-CL" dirty="0" smtClean="0"/>
+              <a:t>, interactuar </a:t>
+            </a:r>
+            <a:r>
+              <a:rPr lang="es-CL" dirty="0" smtClean="0"/>
+              <a:t>con bases de datos, verificar manejos de sesiones de usuarios, montar la página en un servidor, y desde este “servir” todas las vistas que el </a:t>
+            </a:r>
+            <a:r>
+              <a:rPr lang="es-CL" dirty="0" err="1" smtClean="0"/>
+              <a:t>FrontEnd</a:t>
+            </a:r>
+            <a:r>
+              <a:rPr lang="es-CL" dirty="0" smtClean="0"/>
+              <a:t> </a:t>
+            </a:r>
+            <a:r>
+              <a:rPr lang="es-CL" dirty="0" smtClean="0"/>
+              <a:t>crea.</a:t>
+            </a:r>
+          </a:p>
+          <a:p>
+            <a:endParaRPr lang="es-CL" dirty="0" smtClean="0"/>
+          </a:p>
+          <a:p>
+            <a:pPr>
+              <a:buNone/>
+            </a:pPr>
+            <a:endParaRPr lang="es-CL" dirty="0" smtClean="0"/>
+          </a:p>
+        </p:txBody>
+      </p:sp>
+    </p:spTree>
+  </p:cSld>
+  <p:clrMapOvr>
+    <a:masterClrMapping/>
+  </p:clrMapOvr>
+</p:sld>
+</file>
+
+<file path=ppt/slides/slide9.xml><?xml version="1.0" encoding="utf-8"?>
+<p:sld xmlns:a="http://schemas.openxmlformats.org/drawingml/2006/main" xmlns:r="http://schemas.openxmlformats.org/officeDocument/2006/relationships" xmlns:p="http://schemas.openxmlformats.org/presentationml/2006/main">
+  <p:cSld>
+    <p:spTree>
+      <p:nvGrpSpPr>
+        <p:cNvPr id="1" name=""/>
+        <p:cNvGrpSpPr/>
+        <p:nvPr/>
+      </p:nvGrpSpPr>
+      <p:grpSpPr>
+        <a:xfrm>
+          <a:off x="0" y="0"/>
+          <a:ext cx="0" cy="0"/>
+          <a:chOff x="0" y="0"/>
+          <a:chExt cx="0" cy="0"/>
+        </a:xfrm>
+      </p:grpSpPr>
+      <p:sp>
+        <p:nvSpPr>
+          <p:cNvPr id="2" name="1 Título"/>
+          <p:cNvSpPr>
+            <a:spLocks noGrp="1"/>
+          </p:cNvSpPr>
+          <p:nvPr>
+            <p:ph type="title"/>
+          </p:nvPr>
+        </p:nvSpPr>
+        <p:spPr/>
+        <p:txBody>
+          <a:bodyPr/>
+          <a:lstStyle/>
+          <a:p>
+            <a:r>
+              <a:rPr lang="es-CL" dirty="0" err="1" smtClean="0"/>
+              <a:t>Backend</a:t>
+            </a:r>
+            <a:endParaRPr lang="es-CL" dirty="0"/>
+          </a:p>
+        </p:txBody>
+      </p:sp>
+      <p:sp>
+        <p:nvSpPr>
+          <p:cNvPr id="3" name="2 Marcador de contenido"/>
+          <p:cNvSpPr>
+            <a:spLocks noGrp="1"/>
+          </p:cNvSpPr>
+          <p:nvPr>
+            <p:ph idx="1"/>
+          </p:nvPr>
+        </p:nvSpPr>
+        <p:spPr>
+          <a:xfrm>
+            <a:off x="2458583" y="1824842"/>
+            <a:ext cx="8915400" cy="3777622"/>
+          </a:xfrm>
+        </p:spPr>
+        <p:txBody>
+          <a:bodyPr>
+            <a:normAutofit/>
+          </a:bodyPr>
+          <a:lstStyle/>
+          <a:p>
+            <a:r>
+              <a:rPr lang="es-CL" dirty="0" smtClean="0"/>
+              <a:t>Lenguajes y Framework</a:t>
+            </a:r>
+          </a:p>
+          <a:p>
+            <a:pPr lvl="1"/>
+            <a:r>
+              <a:rPr lang="es-CL" dirty="0" smtClean="0"/>
+              <a:t>Java	(Spring MVC, </a:t>
+            </a:r>
+            <a:r>
+              <a:rPr lang="es-CL" dirty="0" err="1" smtClean="0"/>
+              <a:t>Struts</a:t>
+            </a:r>
+            <a:r>
+              <a:rPr lang="es-CL" dirty="0" smtClean="0"/>
+              <a:t> 2)</a:t>
+            </a:r>
+          </a:p>
+          <a:p>
+            <a:pPr lvl="1"/>
+            <a:r>
+              <a:rPr lang="es-CL" dirty="0" err="1" smtClean="0"/>
+              <a:t>Python</a:t>
+            </a:r>
+            <a:r>
+              <a:rPr lang="es-CL" dirty="0" smtClean="0"/>
+              <a:t> (Django, </a:t>
+            </a:r>
+            <a:r>
+              <a:rPr lang="es-CL" dirty="0" err="1" smtClean="0">
+                <a:hlinkClick r:id="rId2"/>
+              </a:rPr>
+              <a:t>F</a:t>
+            </a:r>
+            <a:r>
+              <a:rPr lang="es-CL" dirty="0" err="1" smtClean="0">
+                <a:hlinkClick r:id="rId2"/>
+              </a:rPr>
+              <a:t>las</a:t>
+            </a:r>
+            <a:r>
+              <a:rPr lang="es-CL" dirty="0" err="1" smtClean="0">
+                <a:hlinkClick r:id="rId2"/>
+              </a:rPr>
+              <a:t>k</a:t>
+            </a:r>
+            <a:r>
+              <a:rPr lang="es-CL" dirty="0" smtClean="0"/>
+              <a:t> , </a:t>
+            </a:r>
+            <a:r>
+              <a:rPr lang="es-CL" dirty="0" smtClean="0"/>
+              <a:t>Tornado)</a:t>
+            </a:r>
+          </a:p>
+          <a:p>
+            <a:pPr lvl="1"/>
+            <a:r>
+              <a:rPr lang="es-CL" dirty="0" smtClean="0"/>
+              <a:t>Elixir (PHOENIX, </a:t>
+            </a:r>
+            <a:r>
+              <a:rPr lang="es-CL" dirty="0" err="1" smtClean="0"/>
+              <a:t>Sugar</a:t>
+            </a:r>
+            <a:r>
+              <a:rPr lang="es-CL" dirty="0" smtClean="0"/>
+              <a:t>)</a:t>
+            </a:r>
+          </a:p>
+          <a:p>
+            <a:pPr lvl="1"/>
+            <a:r>
+              <a:rPr lang="es-CL" dirty="0" err="1" smtClean="0"/>
+              <a:t>Rust</a:t>
+            </a:r>
+            <a:r>
+              <a:rPr lang="es-CL" dirty="0" smtClean="0"/>
+              <a:t> (IRON, </a:t>
+            </a:r>
+            <a:r>
+              <a:rPr lang="es-CL" dirty="0" err="1" smtClean="0">
+                <a:hlinkClick r:id="rId3"/>
+              </a:rPr>
+              <a:t>rustful</a:t>
+            </a:r>
+            <a:r>
+              <a:rPr lang="es-CL" dirty="0" smtClean="0"/>
+              <a:t>)</a:t>
+            </a:r>
+          </a:p>
+          <a:p>
+            <a:pPr lvl="1"/>
+            <a:r>
+              <a:rPr lang="es-CL" dirty="0" err="1" smtClean="0"/>
+              <a:t>Go</a:t>
+            </a:r>
+            <a:r>
+              <a:rPr lang="es-CL" dirty="0" smtClean="0"/>
+              <a:t>(</a:t>
+            </a:r>
+            <a:r>
+              <a:rPr lang="es-CL" dirty="0" err="1" smtClean="0"/>
+              <a:t>Revel</a:t>
+            </a:r>
+            <a:r>
+              <a:rPr lang="es-CL" dirty="0" smtClean="0"/>
+              <a:t>, </a:t>
+            </a:r>
+            <a:r>
+              <a:rPr lang="es-CL" dirty="0" err="1" smtClean="0"/>
+              <a:t>beego</a:t>
+            </a:r>
+            <a:r>
+              <a:rPr lang="es-CL" dirty="0" smtClean="0"/>
+              <a:t>)</a:t>
+            </a:r>
+          </a:p>
+          <a:p>
+            <a:pPr lvl="1"/>
+            <a:r>
+              <a:rPr lang="es-CL" dirty="0" smtClean="0"/>
+              <a:t>PHP (</a:t>
+            </a:r>
+            <a:r>
+              <a:rPr lang="es-CL" dirty="0" err="1" smtClean="0"/>
+              <a:t>Laravel</a:t>
+            </a:r>
+            <a:r>
+              <a:rPr lang="es-CL" dirty="0" smtClean="0"/>
+              <a:t>, </a:t>
+            </a:r>
+            <a:r>
+              <a:rPr lang="es-CL" dirty="0" err="1" smtClean="0"/>
+              <a:t>Fat</a:t>
+            </a:r>
+            <a:r>
+              <a:rPr lang="es-CL" dirty="0" smtClean="0"/>
+              <a:t>-Free Framework)</a:t>
+            </a:r>
+          </a:p>
+          <a:p>
+            <a:pPr lvl="1"/>
+            <a:r>
+              <a:rPr lang="es-CL" dirty="0" err="1" smtClean="0"/>
+              <a:t>Ruby</a:t>
+            </a:r>
+            <a:r>
+              <a:rPr lang="es-CL" dirty="0" smtClean="0"/>
+              <a:t> (</a:t>
+            </a:r>
+            <a:r>
+              <a:rPr lang="es-CL" dirty="0" err="1" smtClean="0"/>
+              <a:t>Ruby</a:t>
+            </a:r>
+            <a:r>
+              <a:rPr lang="es-CL" dirty="0" smtClean="0"/>
+              <a:t> </a:t>
+            </a:r>
+            <a:r>
+              <a:rPr lang="es-CL" dirty="0" err="1" smtClean="0"/>
+              <a:t>on</a:t>
+            </a:r>
+            <a:r>
+              <a:rPr lang="es-CL" dirty="0" smtClean="0"/>
+              <a:t> </a:t>
+            </a:r>
+            <a:r>
+              <a:rPr lang="es-CL" dirty="0" err="1" smtClean="0"/>
+              <a:t>Rails</a:t>
+            </a:r>
+            <a:r>
+              <a:rPr lang="es-CL" dirty="0" smtClean="0"/>
+              <a:t>)</a:t>
+            </a:r>
+            <a:endParaRPr lang="es-CL" dirty="0" smtClean="0"/>
+          </a:p>
+          <a:p>
+            <a:pPr lvl="1"/>
+            <a:r>
+              <a:rPr lang="es-CL" dirty="0" smtClean="0"/>
+              <a:t>C# (</a:t>
+            </a:r>
+            <a:r>
+              <a:rPr lang="es-CL" dirty="0" err="1" smtClean="0"/>
+              <a:t>.Net</a:t>
+            </a:r>
+            <a:r>
+              <a:rPr lang="es-CL" dirty="0" smtClean="0"/>
+              <a:t> 4.5)</a:t>
+            </a:r>
+          </a:p>
+          <a:p>
+            <a:pPr lvl="1"/>
+            <a:r>
+              <a:rPr lang="es-CL" dirty="0" err="1" smtClean="0"/>
+              <a:t>Swift</a:t>
+            </a:r>
+            <a:r>
+              <a:rPr lang="es-CL" dirty="0" smtClean="0"/>
+              <a:t> (</a:t>
+            </a:r>
+            <a:r>
+              <a:rPr lang="es-CL" dirty="0" err="1" smtClean="0">
+                <a:hlinkClick r:id="rId4"/>
+              </a:rPr>
+              <a:t>Cocoa</a:t>
+            </a:r>
+            <a:r>
+              <a:rPr lang="es-CL" dirty="0" smtClean="0"/>
+              <a:t> y </a:t>
+            </a:r>
+            <a:r>
+              <a:rPr lang="es-CL" dirty="0" err="1" smtClean="0">
+                <a:hlinkClick r:id="rId5" tooltip="Cocoa Touch"/>
+              </a:rPr>
+              <a:t>Cocoa</a:t>
+            </a:r>
+            <a:r>
+              <a:rPr lang="es-CL" dirty="0" smtClean="0">
+                <a:hlinkClick r:id="rId5" tooltip="Cocoa Touch"/>
+              </a:rPr>
+              <a:t> </a:t>
+            </a:r>
+            <a:r>
+              <a:rPr lang="es-CL" dirty="0" err="1" smtClean="0">
+                <a:hlinkClick r:id="rId5" tooltip="Cocoa Touch"/>
+              </a:rPr>
+              <a:t>Touch</a:t>
+            </a:r>
+            <a:r>
+              <a:rPr lang="es-CL" dirty="0" smtClean="0"/>
+              <a:t>)</a:t>
+            </a:r>
+          </a:p>
+          <a:p>
+            <a:endParaRPr lang="es-CL" dirty="0"/>
+          </a:p>
+        </p:txBody>
+      </p:sp>
+    </p:spTree>
+  </p:cSld>
+  <p:clrMapOvr>
+    <a:masterClrMapping/>
+  </p:clrMapOvr>
 </p:sld>
 </file>
 
@@ -8551,7 +9729,7 @@
     </a:clrScheme>
     <a:fontScheme name="Wisp">
       <a:majorFont>
-        <a:latin typeface="Century Gothic" panose="020B0502020202020204"/>
+        <a:latin typeface="Century Gothic"/>
         <a:ea typeface=""/>
         <a:cs typeface=""/>
         <a:font script="Jpan" typeface="メイリオ"/>
@@ -8586,7 +9764,7 @@
         <a:font script="Geor" typeface="Sylfaen"/>
       </a:majorFont>
       <a:minorFont>
-        <a:latin typeface="Century Gothic" panose="020B0502020202020204"/>
+        <a:latin typeface="Century Gothic"/>
         <a:ea typeface=""/>
         <a:cs typeface=""/>
         <a:font script="Jpan" typeface="メイリオ"/>
@@ -8745,7 +9923,7 @@
   <a:extraClrSchemeLst/>
   <a:extLst>
     <a:ext uri="{05A4C25C-085E-4340-85A3-A5531E510DB2}">
-      <thm15:themeFamily xmlns:thm15="http://schemas.microsoft.com/office/thememl/2012/main" name="Wisp" id="{7CB32D59-10C0-40DD-B7BD-2E94284A981C}" vid="{24B1A44C-C006-48B2-A4D7-E5549B3D8CD4}"/>
+      <thm15:themeFamily xmlns:thm15="http://schemas.microsoft.com/office/thememl/2012/main" xmlns="" name="Wisp" id="{7CB32D59-10C0-40DD-B7BD-2E94284A981C}" vid="{24B1A44C-C006-48B2-A4D7-E5549B3D8CD4}"/>
     </a:ext>
   </a:extLst>
 </a:theme>

</xml_diff>